<commit_message>
Presentation - pdf update
</commit_message>
<xml_diff>
--- a/Chicago Crime 210816.pptx
+++ b/Chicago Crime 210816.pptx
@@ -20,18 +20,23 @@
   <p:notesSz cx="6858000" cy="9144000"/>
   <p:embeddedFontLst>
     <p:embeddedFont>
-      <p:font typeface="Quattrocento Sans" panose="020B0604020202020204" charset="0"/>
+      <p:font typeface="Avenir" panose="02000503020000020003" pitchFamily="2" charset="0"/>
       <p:regular r:id="rId10"/>
-      <p:bold r:id="rId11"/>
-      <p:italic r:id="rId12"/>
-      <p:boldItalic r:id="rId13"/>
+      <p:italic r:id="rId11"/>
     </p:embeddedFont>
     <p:embeddedFont>
-      <p:font typeface="Rockwell" panose="02060603020205020403" pitchFamily="18" charset="0"/>
-      <p:regular r:id="rId14"/>
-      <p:bold r:id="rId15"/>
-      <p:italic r:id="rId16"/>
-      <p:boldItalic r:id="rId17"/>
+      <p:font typeface="Quattrocento Sans" panose="020B0502050000020003" pitchFamily="34" charset="0"/>
+      <p:regular r:id="rId12"/>
+      <p:bold r:id="rId13"/>
+      <p:italic r:id="rId14"/>
+      <p:boldItalic r:id="rId15"/>
+    </p:embeddedFont>
+    <p:embeddedFont>
+      <p:font typeface="Rockwell" panose="02060603020205020403" pitchFamily="18" charset="77"/>
+      <p:regular r:id="rId16"/>
+      <p:bold r:id="rId17"/>
+      <p:italic r:id="rId18"/>
+      <p:boldItalic r:id="rId19"/>
     </p:embeddedFont>
   </p:embeddedFontLst>
   <p:defaultTextStyle>
@@ -264,8 +269,11 @@
     </a:lvl9pPr>
   </p:defaultTextStyle>
   <p:extLst>
+    <p:ext uri="{EFAFB233-063F-42B5-8137-9DF3F51BA10A}">
+      <p15:sldGuideLst xmlns:p15="http://schemas.microsoft.com/office/powerpoint/2012/main"/>
+    </p:ext>
     <p:ext uri="http://customooxmlschemas.google.com/">
-      <go:slidesCustomData xmlns:go="http://customooxmlschemas.google.com/" xmlns:ahyp="http://schemas.microsoft.com/office/drawing/2018/hyperlinkcolor" xmlns:p15="http://schemas.microsoft.com/office/powerpoint/2012/main" xmlns:p14="http://schemas.microsoft.com/office/powerpoint/2010/main" xmlns:com="http://schemas.openxmlformats.org/drawingml/2006/compatibility" xmlns:pvml="urn:schemas-microsoft-com:office:powerpoint" xmlns:v="urn:schemas-microsoft-com:vml" xmlns:o="urn:schemas-microsoft-com:office:office" xmlns:dgm="http://schemas.openxmlformats.org/drawingml/2006/diagram" xmlns:c="http://schemas.openxmlformats.org/drawingml/2006/chart" xmlns:mv="urn:schemas-microsoft-com:mac:vml" xmlns:mc="http://schemas.openxmlformats.org/markup-compatibility/2006" xmlns="" r:id="rId18" roundtripDataSignature="AMtx7mjoO25C00Zv/+TCLlWxRbOdfy22WA=="/>
+      <go:slidesCustomData xmlns="" xmlns:mc="http://schemas.openxmlformats.org/markup-compatibility/2006" xmlns:mv="urn:schemas-microsoft-com:mac:vml" xmlns:c="http://schemas.openxmlformats.org/drawingml/2006/chart" xmlns:dgm="http://schemas.openxmlformats.org/drawingml/2006/diagram" xmlns:o="urn:schemas-microsoft-com:office:office" xmlns:v="urn:schemas-microsoft-com:vml" xmlns:pvml="urn:schemas-microsoft-com:office:powerpoint" xmlns:com="http://schemas.openxmlformats.org/drawingml/2006/compatibility" xmlns:p14="http://schemas.microsoft.com/office/powerpoint/2010/main" xmlns:p15="http://schemas.microsoft.com/office/powerpoint/2012/main" xmlns:ahyp="http://schemas.microsoft.com/office/drawing/2018/hyperlinkcolor" xmlns:go="http://customooxmlschemas.google.com/" r:id="rId20" roundtripDataSignature="AMtx7mjoO25C00Zv/+TCLlWxRbOdfy22WA=="/>
     </p:ext>
   </p:extLst>
 </p:presentation>
@@ -18187,8 +18195,21 @@
                   <a:srgbClr val="7F6000"/>
                 </a:solidFill>
               </a:rPr>
-              <a:t>/v1.0/dropdown</a:t>
+              <a:t>/v1.0</a:t>
             </a:r>
+            <a:r>
+              <a:rPr lang="en-US" sz="2000" b="1">
+                <a:solidFill>
+                  <a:srgbClr val="7F6000"/>
+                </a:solidFill>
+              </a:rPr>
+              <a:t>/dashboard</a:t>
+            </a:r>
+            <a:endParaRPr lang="en-US" sz="2000" b="1" dirty="0">
+              <a:solidFill>
+                <a:srgbClr val="7F6000"/>
+              </a:solidFill>
+            </a:endParaRPr>
           </a:p>
           <a:p>
             <a:pPr marL="914400" lvl="0" indent="-355600" algn="l" rtl="0">

</xml_diff>